<commit_message>
2017.08.07 - TableViewer 까지 추가 함
</commit_message>
<xml_diff>
--- a/doc/요구사항분석_170725_jslee.pptx
+++ b/doc/요구사항분석_170725_jslee.pptx
@@ -256,7 +256,7 @@
           <a:p>
             <a:fld id="{018CE449-18F1-4D80-AC82-DC8A8BADA3D2}" type="datetimeFigureOut">
               <a:rPr lang="ko-KR" altLang="en-US" smtClean="0"/>
-              <a:t>2017-07-25</a:t>
+              <a:t>2017-08-07</a:t>
             </a:fld>
             <a:endParaRPr lang="ko-KR" altLang="en-US"/>
           </a:p>
@@ -426,7 +426,7 @@
           <a:p>
             <a:fld id="{018CE449-18F1-4D80-AC82-DC8A8BADA3D2}" type="datetimeFigureOut">
               <a:rPr lang="ko-KR" altLang="en-US" smtClean="0"/>
-              <a:t>2017-07-25</a:t>
+              <a:t>2017-08-07</a:t>
             </a:fld>
             <a:endParaRPr lang="ko-KR" altLang="en-US"/>
           </a:p>
@@ -606,7 +606,7 @@
           <a:p>
             <a:fld id="{018CE449-18F1-4D80-AC82-DC8A8BADA3D2}" type="datetimeFigureOut">
               <a:rPr lang="ko-KR" altLang="en-US" smtClean="0"/>
-              <a:t>2017-07-25</a:t>
+              <a:t>2017-08-07</a:t>
             </a:fld>
             <a:endParaRPr lang="ko-KR" altLang="en-US"/>
           </a:p>
@@ -776,7 +776,7 @@
           <a:p>
             <a:fld id="{018CE449-18F1-4D80-AC82-DC8A8BADA3D2}" type="datetimeFigureOut">
               <a:rPr lang="ko-KR" altLang="en-US" smtClean="0"/>
-              <a:t>2017-07-25</a:t>
+              <a:t>2017-08-07</a:t>
             </a:fld>
             <a:endParaRPr lang="ko-KR" altLang="en-US"/>
           </a:p>
@@ -1022,7 +1022,7 @@
           <a:p>
             <a:fld id="{018CE449-18F1-4D80-AC82-DC8A8BADA3D2}" type="datetimeFigureOut">
               <a:rPr lang="ko-KR" altLang="en-US" smtClean="0"/>
-              <a:t>2017-07-25</a:t>
+              <a:t>2017-08-07</a:t>
             </a:fld>
             <a:endParaRPr lang="ko-KR" altLang="en-US"/>
           </a:p>
@@ -1254,7 +1254,7 @@
           <a:p>
             <a:fld id="{018CE449-18F1-4D80-AC82-DC8A8BADA3D2}" type="datetimeFigureOut">
               <a:rPr lang="ko-KR" altLang="en-US" smtClean="0"/>
-              <a:t>2017-07-25</a:t>
+              <a:t>2017-08-07</a:t>
             </a:fld>
             <a:endParaRPr lang="ko-KR" altLang="en-US"/>
           </a:p>
@@ -1621,7 +1621,7 @@
           <a:p>
             <a:fld id="{018CE449-18F1-4D80-AC82-DC8A8BADA3D2}" type="datetimeFigureOut">
               <a:rPr lang="ko-KR" altLang="en-US" smtClean="0"/>
-              <a:t>2017-07-25</a:t>
+              <a:t>2017-08-07</a:t>
             </a:fld>
             <a:endParaRPr lang="ko-KR" altLang="en-US"/>
           </a:p>
@@ -1739,7 +1739,7 @@
           <a:p>
             <a:fld id="{018CE449-18F1-4D80-AC82-DC8A8BADA3D2}" type="datetimeFigureOut">
               <a:rPr lang="ko-KR" altLang="en-US" smtClean="0"/>
-              <a:t>2017-07-25</a:t>
+              <a:t>2017-08-07</a:t>
             </a:fld>
             <a:endParaRPr lang="ko-KR" altLang="en-US"/>
           </a:p>
@@ -1834,7 +1834,7 @@
           <a:p>
             <a:fld id="{018CE449-18F1-4D80-AC82-DC8A8BADA3D2}" type="datetimeFigureOut">
               <a:rPr lang="ko-KR" altLang="en-US" smtClean="0"/>
-              <a:t>2017-07-25</a:t>
+              <a:t>2017-08-07</a:t>
             </a:fld>
             <a:endParaRPr lang="ko-KR" altLang="en-US"/>
           </a:p>
@@ -2111,7 +2111,7 @@
           <a:p>
             <a:fld id="{018CE449-18F1-4D80-AC82-DC8A8BADA3D2}" type="datetimeFigureOut">
               <a:rPr lang="ko-KR" altLang="en-US" smtClean="0"/>
-              <a:t>2017-07-25</a:t>
+              <a:t>2017-08-07</a:t>
             </a:fld>
             <a:endParaRPr lang="ko-KR" altLang="en-US"/>
           </a:p>
@@ -2364,7 +2364,7 @@
           <a:p>
             <a:fld id="{018CE449-18F1-4D80-AC82-DC8A8BADA3D2}" type="datetimeFigureOut">
               <a:rPr lang="ko-KR" altLang="en-US" smtClean="0"/>
-              <a:t>2017-07-25</a:t>
+              <a:t>2017-08-07</a:t>
             </a:fld>
             <a:endParaRPr lang="ko-KR" altLang="en-US"/>
           </a:p>
@@ -2577,7 +2577,7 @@
           <a:p>
             <a:fld id="{018CE449-18F1-4D80-AC82-DC8A8BADA3D2}" type="datetimeFigureOut">
               <a:rPr lang="ko-KR" altLang="en-US" smtClean="0"/>
-              <a:t>2017-07-25</a:t>
+              <a:t>2017-08-07</a:t>
             </a:fld>
             <a:endParaRPr lang="ko-KR" altLang="en-US"/>
           </a:p>
@@ -15029,6 +15029,40 @@
               </a:rPr>
               <a:t>.</a:t>
             </a:r>
+            <a:br>
+              <a:rPr lang="en-US" altLang="ko-KR" sz="1600" b="1" dirty="0" smtClean="0">
+                <a:solidFill>
+                  <a:srgbClr val="FF0000"/>
+                </a:solidFill>
+                <a:sym typeface="Wingdings" panose="05000000000000000000" pitchFamily="2" charset="2"/>
+              </a:rPr>
+            </a:br>
+            <a:r>
+              <a:rPr lang="en-US" altLang="ko-KR" sz="1600" b="1" dirty="0" smtClean="0">
+                <a:solidFill>
+                  <a:srgbClr val="FF0000"/>
+                </a:solidFill>
+                <a:sym typeface="Wingdings" panose="05000000000000000000" pitchFamily="2" charset="2"/>
+              </a:rPr>
+              <a:t/>
+            </a:r>
+            <a:br>
+              <a:rPr lang="en-US" altLang="ko-KR" sz="1600" b="1" dirty="0" smtClean="0">
+                <a:solidFill>
+                  <a:srgbClr val="FF0000"/>
+                </a:solidFill>
+                <a:sym typeface="Wingdings" panose="05000000000000000000" pitchFamily="2" charset="2"/>
+              </a:rPr>
+            </a:br>
+            <a:r>
+              <a:rPr lang="en-US" altLang="ko-KR" sz="1600" b="1" dirty="0" smtClean="0">
+                <a:solidFill>
+                  <a:srgbClr val="FF0000"/>
+                </a:solidFill>
+                <a:sym typeface="Wingdings" panose="05000000000000000000" pitchFamily="2" charset="2"/>
+              </a:rPr>
+              <a:t>Coil_design.csv</a:t>
+            </a:r>
             <a:endParaRPr lang="ko-KR" altLang="en-US" sz="1600" b="1" dirty="0">
               <a:solidFill>
                 <a:srgbClr val="FF0000"/>

</xml_diff>